<commit_message>
Adds mle message/tlv heirarchy diagram to poster.
</commit_message>
<xml_diff>
--- a/diagrams/thread-mle-message-tlv-heirarchy/thread-mle-message-tlv-heirarchy.pptx
+++ b/diagrams/thread-mle-message-tlv-heirarchy/thread-mle-message-tlv-heirarchy.pptx
@@ -2927,13 +2927,13 @@
           <p:nvPr>
             <p:extLst>
               <p:ext uri="{D42A27DB-BD31-4B8C-83A1-F6EECF244321}">
-                <p14:modId xmlns:p14="http://schemas.microsoft.com/office/powerpoint/2010/main" val="1870276792"/>
+                <p14:modId xmlns:p14="http://schemas.microsoft.com/office/powerpoint/2010/main" val="511883711"/>
               </p:ext>
             </p:extLst>
           </p:nvPr>
         </p:nvGraphicFramePr>
         <p:xfrm>
-          <a:off x="2383980" y="4414348"/>
+          <a:off x="2284588" y="3678860"/>
           <a:ext cx="6873240" cy="1036309"/>
         </p:xfrm>
         <a:graphic>
@@ -7139,8 +7139,8 @@
         </p:nvSpPr>
         <p:spPr>
           <a:xfrm>
-            <a:off x="2383980" y="3980621"/>
-            <a:ext cx="6664960" cy="369332"/>
+            <a:off x="2284588" y="3245133"/>
+            <a:ext cx="6873240" cy="369332"/>
           </a:xfrm>
           <a:prstGeom prst="rect">
             <a:avLst/>
@@ -7173,8 +7173,8 @@
         </p:nvSpPr>
         <p:spPr>
           <a:xfrm>
-            <a:off x="4102882" y="6513205"/>
-            <a:ext cx="6664960" cy="369332"/>
+            <a:off x="3914282" y="5682891"/>
+            <a:ext cx="6873240" cy="369332"/>
           </a:xfrm>
           <a:prstGeom prst="rect">
             <a:avLst/>
@@ -7207,7 +7207,7 @@
         </p:nvSpPr>
         <p:spPr>
           <a:xfrm>
-            <a:off x="4102882" y="6053975"/>
+            <a:off x="4003490" y="5258853"/>
             <a:ext cx="6664960" cy="369332"/>
           </a:xfrm>
           <a:prstGeom prst="rect">
@@ -7241,7 +7241,7 @@
         </p:nvSpPr>
         <p:spPr>
           <a:xfrm>
-            <a:off x="12587840" y="7352540"/>
+            <a:off x="12488448" y="6522226"/>
             <a:ext cx="4876948" cy="584775"/>
           </a:xfrm>
           <a:prstGeom prst="rect">
@@ -7275,7 +7275,7 @@
         </p:nvSpPr>
         <p:spPr>
           <a:xfrm rot="16200000" flipH="1">
-            <a:off x="7263907" y="1185687"/>
+            <a:off x="7164512" y="330610"/>
             <a:ext cx="342915" cy="9530365"/>
           </a:xfrm>
           <a:prstGeom prst="leftBrace">
@@ -7323,7 +7323,7 @@
         </p:nvSpPr>
         <p:spPr>
           <a:xfrm>
-            <a:off x="12587840" y="4755298"/>
+            <a:off x="12488448" y="4019810"/>
             <a:ext cx="4876948" cy="584775"/>
           </a:xfrm>
           <a:prstGeom prst="rect">
@@ -7344,21 +7344,8 @@
                 <a:ea typeface="Source Serif Pro" charset="0"/>
                 <a:cs typeface="Source Serif Pro" charset="0"/>
               </a:rPr>
-              <a:t>Active Operational Dataset TLV value contains an unbounded list of Network Management </a:t>
+              <a:t>Active Operational Dataset TLV value contains an unbounded list of Network Management TLVs</a:t>
             </a:r>
-            <a:r>
-              <a:rPr lang="en-US" sz="1600" dirty="0">
-                <a:latin typeface="Source Serif Pro" charset="0"/>
-                <a:ea typeface="Source Serif Pro" charset="0"/>
-                <a:cs typeface="Source Serif Pro" charset="0"/>
-              </a:rPr>
-              <a:t>TLVs</a:t>
-            </a:r>
-            <a:endParaRPr lang="en-US" sz="1600" dirty="0">
-              <a:latin typeface="Source Serif Pro" charset="0"/>
-              <a:ea typeface="Source Serif Pro" charset="0"/>
-              <a:cs typeface="Source Serif Pro" charset="0"/>
-            </a:endParaRPr>
           </a:p>
         </p:txBody>
       </p:sp>
@@ -7371,13 +7358,13 @@
           <p:nvPr>
             <p:extLst>
               <p:ext uri="{D42A27DB-BD31-4B8C-83A1-F6EECF244321}">
-                <p14:modId xmlns:p14="http://schemas.microsoft.com/office/powerpoint/2010/main" val="88090783"/>
+                <p14:modId xmlns:p14="http://schemas.microsoft.com/office/powerpoint/2010/main" val="410040895"/>
               </p:ext>
             </p:extLst>
           </p:nvPr>
         </p:nvGraphicFramePr>
         <p:xfrm>
-          <a:off x="4013674" y="6950239"/>
+          <a:off x="3914282" y="6119925"/>
           <a:ext cx="6873240" cy="1010920"/>
         </p:xfrm>
         <a:graphic>
@@ -11583,7 +11570,7 @@
         </p:nvSpPr>
         <p:spPr>
           <a:xfrm>
-            <a:off x="2840768" y="7138565"/>
+            <a:off x="2570789" y="6394552"/>
             <a:ext cx="734094" cy="461665"/>
           </a:xfrm>
           <a:prstGeom prst="rect">
@@ -11614,7 +11601,7 @@
         </p:nvSpPr>
         <p:spPr>
           <a:xfrm>
-            <a:off x="11325726" y="7138565"/>
+            <a:off x="11367061" y="6394551"/>
             <a:ext cx="734094" cy="461665"/>
           </a:xfrm>
           <a:prstGeom prst="rect">
@@ -11646,13 +11633,13 @@
           <p:nvPr>
             <p:extLst>
               <p:ext uri="{D42A27DB-BD31-4B8C-83A1-F6EECF244321}">
-                <p14:modId xmlns:p14="http://schemas.microsoft.com/office/powerpoint/2010/main" val="676052152"/>
+                <p14:modId xmlns:p14="http://schemas.microsoft.com/office/powerpoint/2010/main" val="282299042"/>
               </p:ext>
             </p:extLst>
           </p:nvPr>
         </p:nvGraphicFramePr>
         <p:xfrm>
-          <a:off x="2383980" y="1858797"/>
+          <a:off x="3212332" y="1668125"/>
           <a:ext cx="6873242" cy="1105586"/>
         </p:xfrm>
         <a:graphic>
@@ -12354,14 +12341,6 @@
                         </a:rPr>
                         <a:t>TLV</a:t>
                       </a:r>
-                      <a:endParaRPr lang="en-US" sz="1800" b="0" dirty="0" smtClean="0">
-                        <a:solidFill>
-                          <a:sysClr val="windowText" lastClr="000000"/>
-                        </a:solidFill>
-                        <a:latin typeface="Source Serif Pro" charset="0"/>
-                        <a:ea typeface="Source Serif Pro" charset="0"/>
-                        <a:cs typeface="Source Serif Pro" charset="0"/>
-                      </a:endParaRPr>
                     </a:p>
                   </a:txBody>
                   <a:tcPr anchor="ctr">
@@ -12992,6 +12971,132 @@
           </a:graphicData>
         </a:graphic>
       </p:graphicFrame>
+      <p:sp>
+        <p:nvSpPr>
+          <p:cNvPr id="17" name="TextBox 16"/>
+          <p:cNvSpPr txBox="1"/>
+          <p:nvPr/>
+        </p:nvSpPr>
+        <p:spPr>
+          <a:xfrm>
+            <a:off x="3212332" y="1238865"/>
+            <a:ext cx="6873240" cy="369332"/>
+          </a:xfrm>
+          <a:prstGeom prst="rect">
+            <a:avLst/>
+          </a:prstGeom>
+          <a:noFill/>
+        </p:spPr>
+        <p:txBody>
+          <a:bodyPr wrap="square" rtlCol="0">
+            <a:spAutoFit/>
+          </a:bodyPr>
+          <a:lstStyle/>
+          <a:p>
+            <a:pPr algn="ctr"/>
+            <a:r>
+              <a:rPr lang="en-US" sz="1800" dirty="0" smtClean="0">
+                <a:latin typeface="Source Serif Pro" charset="0"/>
+                <a:ea typeface="Source Serif Pro" charset="0"/>
+                <a:cs typeface="Source Serif Pro" charset="0"/>
+              </a:rPr>
+              <a:t>MLE Message</a:t>
+            </a:r>
+            <a:endParaRPr lang="en-US" sz="1800" dirty="0">
+              <a:latin typeface="Source Serif Pro" charset="0"/>
+              <a:ea typeface="Source Serif Pro" charset="0"/>
+              <a:cs typeface="Source Serif Pro" charset="0"/>
+            </a:endParaRPr>
+          </a:p>
+        </p:txBody>
+      </p:sp>
+      <p:sp>
+        <p:nvSpPr>
+          <p:cNvPr id="18" name="Left Brace 17"/>
+          <p:cNvSpPr/>
+          <p:nvPr/>
+        </p:nvSpPr>
+        <p:spPr>
+          <a:xfrm rot="16200000" flipH="1">
+            <a:off x="5531617" y="-422010"/>
+            <a:ext cx="342915" cy="7005896"/>
+          </a:xfrm>
+          <a:prstGeom prst="leftBrace">
+            <a:avLst/>
+          </a:prstGeom>
+          <a:ln>
+            <a:solidFill>
+              <a:schemeClr val="tx1"/>
+            </a:solidFill>
+          </a:ln>
+        </p:spPr>
+        <p:style>
+          <a:lnRef idx="1">
+            <a:schemeClr val="accent1"/>
+          </a:lnRef>
+          <a:fillRef idx="0">
+            <a:schemeClr val="accent1"/>
+          </a:fillRef>
+          <a:effectRef idx="0">
+            <a:schemeClr val="accent1"/>
+          </a:effectRef>
+          <a:fontRef idx="minor">
+            <a:schemeClr val="tx1"/>
+          </a:fontRef>
+        </p:style>
+        <p:txBody>
+          <a:bodyPr rot="0" spcFirstLastPara="0" vertOverflow="overflow" horzOverflow="overflow" vert="horz" wrap="square" lIns="91440" tIns="45720" rIns="91440" bIns="45720" numCol="1" spcCol="0" rtlCol="0" fromWordArt="0" anchor="ctr" anchorCtr="0" forceAA="0" compatLnSpc="1">
+            <a:prstTxWarp prst="textNoShape">
+              <a:avLst/>
+            </a:prstTxWarp>
+            <a:noAutofit/>
+          </a:bodyPr>
+          <a:lstStyle/>
+          <a:p>
+            <a:pPr algn="ctr"/>
+            <a:endParaRPr lang="en-US" sz="1800"/>
+          </a:p>
+        </p:txBody>
+      </p:sp>
+      <p:sp>
+        <p:nvSpPr>
+          <p:cNvPr id="21" name="TextBox 20"/>
+          <p:cNvSpPr txBox="1"/>
+          <p:nvPr/>
+        </p:nvSpPr>
+        <p:spPr>
+          <a:xfrm>
+            <a:off x="12336263" y="2082432"/>
+            <a:ext cx="4876948" cy="338554"/>
+          </a:xfrm>
+          <a:prstGeom prst="rect">
+            <a:avLst/>
+          </a:prstGeom>
+          <a:noFill/>
+        </p:spPr>
+        <p:txBody>
+          <a:bodyPr wrap="square" rtlCol="0">
+            <a:spAutoFit/>
+          </a:bodyPr>
+          <a:lstStyle/>
+          <a:p>
+            <a:pPr algn="just"/>
+            <a:r>
+              <a:rPr lang="en-US" sz="1600" dirty="0" smtClean="0">
+                <a:latin typeface="Source Serif Pro" charset="0"/>
+                <a:ea typeface="Source Serif Pro" charset="0"/>
+                <a:cs typeface="Source Serif Pro" charset="0"/>
+              </a:rPr>
+              <a:t>MLE message contains an unbounded list of TLVs</a:t>
+            </a:r>
+            <a:endParaRPr lang="en-US" sz="1600" dirty="0">
+              <a:latin typeface="Source Serif Pro" charset="0"/>
+              <a:ea typeface="Source Serif Pro" charset="0"/>
+              <a:cs typeface="Source Serif Pro" charset="0"/>
+            </a:endParaRPr>
+          </a:p>
+        </p:txBody>
+      </p:sp>
     </p:spTree>
     <p:extLst>
       <p:ext uri="{BB962C8B-B14F-4D97-AF65-F5344CB8AC3E}">

</xml_diff>